<commit_message>
added old method to presentation
</commit_message>
<xml_diff>
--- a/Documentation/CodeSwapPresentation.pptx
+++ b/Documentation/CodeSwapPresentation.pptx
@@ -5,16 +5,17 @@
     <p:sldMasterId id="2147483655" r:id="rId1"/>
   </p:sldMasterIdLst>
   <p:notesMasterIdLst>
-    <p:notesMasterId r:id="rId9"/>
+    <p:notesMasterId r:id="rId10"/>
   </p:notesMasterIdLst>
   <p:sldIdLst>
     <p:sldId id="256" r:id="rId2"/>
     <p:sldId id="257" r:id="rId3"/>
-    <p:sldId id="258" r:id="rId4"/>
-    <p:sldId id="259" r:id="rId5"/>
-    <p:sldId id="260" r:id="rId6"/>
-    <p:sldId id="261" r:id="rId7"/>
-    <p:sldId id="262" r:id="rId8"/>
+    <p:sldId id="263" r:id="rId4"/>
+    <p:sldId id="258" r:id="rId5"/>
+    <p:sldId id="259" r:id="rId6"/>
+    <p:sldId id="260" r:id="rId7"/>
+    <p:sldId id="261" r:id="rId8"/>
+    <p:sldId id="262" r:id="rId9"/>
   </p:sldIdLst>
   <p:sldSz cx="9144000" cy="6858000" type="screen4x3"/>
   <p:notesSz cx="6858000" cy="9144000"/>
@@ -5174,6 +5175,94 @@
 <file path=ppt/slides/slide3.xml><?xml version="1.0" encoding="utf-8"?>
 <p:sld xmlns:a="http://schemas.openxmlformats.org/drawingml/2006/main" xmlns:r="http://schemas.openxmlformats.org/officeDocument/2006/relationships" xmlns:p="http://schemas.openxmlformats.org/presentationml/2006/main">
   <p:cSld>
+    <p:spTree>
+      <p:nvGrpSpPr>
+        <p:cNvPr id="1" name=""/>
+        <p:cNvGrpSpPr/>
+        <p:nvPr/>
+      </p:nvGrpSpPr>
+      <p:grpSpPr>
+        <a:xfrm>
+          <a:off x="0" y="0"/>
+          <a:ext cx="0" cy="0"/>
+          <a:chOff x="0" y="0"/>
+          <a:chExt cx="0" cy="0"/>
+        </a:xfrm>
+      </p:grpSpPr>
+      <p:sp>
+        <p:nvSpPr>
+          <p:cNvPr id="3" name="Title 2"/>
+          <p:cNvSpPr>
+            <a:spLocks noGrp="1"/>
+          </p:cNvSpPr>
+          <p:nvPr>
+            <p:ph type="title"/>
+          </p:nvPr>
+        </p:nvSpPr>
+        <p:spPr/>
+        <p:txBody>
+          <a:bodyPr/>
+          <a:lstStyle/>
+          <a:p>
+            <a:r>
+              <a:rPr lang="en-US" dirty="0" smtClean="0"/>
+              <a:t>The Old Method</a:t>
+            </a:r>
+            <a:endParaRPr lang="en-US" dirty="0"/>
+          </a:p>
+        </p:txBody>
+      </p:sp>
+      <p:pic>
+        <p:nvPicPr>
+          <p:cNvPr id="8" name="Picture 7"/>
+          <p:cNvPicPr>
+            <a:picLocks noChangeAspect="1"/>
+          </p:cNvPicPr>
+          <p:nvPr/>
+        </p:nvPicPr>
+        <p:blipFill>
+          <a:blip r:embed="rId2">
+            <a:extLst>
+              <a:ext uri="{28A0092B-C50C-407E-A947-70E740481C1C}">
+                <a14:useLocalDpi xmlns:a14="http://schemas.microsoft.com/office/drawing/2010/main" val="0"/>
+              </a:ext>
+            </a:extLst>
+          </a:blip>
+          <a:stretch>
+            <a:fillRect/>
+          </a:stretch>
+        </p:blipFill>
+        <p:spPr>
+          <a:xfrm>
+            <a:off x="2555776" y="1560909"/>
+            <a:ext cx="3388953" cy="4820419"/>
+          </a:xfrm>
+          <a:prstGeom prst="rect">
+            <a:avLst/>
+          </a:prstGeom>
+          <a:ln w="57150">
+            <a:solidFill>
+              <a:schemeClr val="tx2"/>
+            </a:solidFill>
+          </a:ln>
+        </p:spPr>
+      </p:pic>
+    </p:spTree>
+    <p:extLst>
+      <p:ext uri="{BB962C8B-B14F-4D97-AF65-F5344CB8AC3E}">
+        <p14:creationId xmlns:p14="http://schemas.microsoft.com/office/powerpoint/2010/main" val="642457458"/>
+      </p:ext>
+    </p:extLst>
+  </p:cSld>
+  <p:clrMapOvr>
+    <a:masterClrMapping/>
+  </p:clrMapOvr>
+</p:sld>
+</file>
+
+<file path=ppt/slides/slide4.xml><?xml version="1.0" encoding="utf-8"?>
+<p:sld xmlns:a="http://schemas.openxmlformats.org/drawingml/2006/main" xmlns:r="http://schemas.openxmlformats.org/officeDocument/2006/relationships" xmlns:p="http://schemas.openxmlformats.org/presentationml/2006/main">
+  <p:cSld>
     <p:bg>
       <p:bgRef idx="1001">
         <a:schemeClr val="bg1"/>
@@ -5362,7 +5451,7 @@
 </p:sld>
 </file>
 
-<file path=ppt/slides/slide4.xml><?xml version="1.0" encoding="utf-8"?>
+<file path=ppt/slides/slide5.xml><?xml version="1.0" encoding="utf-8"?>
 <p:sld xmlns:a="http://schemas.openxmlformats.org/drawingml/2006/main" xmlns:r="http://schemas.openxmlformats.org/officeDocument/2006/relationships" xmlns:p="http://schemas.openxmlformats.org/presentationml/2006/main">
   <p:cSld>
     <p:spTree>
@@ -5648,7 +5737,7 @@
 </p:sld>
 </file>
 
-<file path=ppt/slides/slide5.xml><?xml version="1.0" encoding="utf-8"?>
+<file path=ppt/slides/slide6.xml><?xml version="1.0" encoding="utf-8"?>
 <p:sld xmlns:a="http://schemas.openxmlformats.org/drawingml/2006/main" xmlns:r="http://schemas.openxmlformats.org/officeDocument/2006/relationships" xmlns:p="http://schemas.openxmlformats.org/presentationml/2006/main">
   <p:cSld>
     <p:spTree>
@@ -5773,230 +5862,6 @@
             <a:r>
               <a:rPr lang="en"/>
               <a:t>Code Review Process, Part 1</a:t>
-            </a:r>
-          </a:p>
-        </p:txBody>
-      </p:sp>
-    </p:spTree>
-  </p:cSld>
-  <p:clrMapOvr>
-    <a:masterClrMapping/>
-  </p:clrMapOvr>
-  <p:transition spd="slow">
-    <p:cut/>
-  </p:transition>
-  <p:timing>
-    <p:tnLst>
-      <p:par>
-        <p:cTn id="1" dur="indefinite" restart="never" nodeType="tmRoot"/>
-      </p:par>
-    </p:tnLst>
-  </p:timing>
-</p:sld>
-</file>
-
-<file path=ppt/slides/slide6.xml><?xml version="1.0" encoding="utf-8"?>
-<p:sld xmlns:a="http://schemas.openxmlformats.org/drawingml/2006/main" xmlns:r="http://schemas.openxmlformats.org/officeDocument/2006/relationships" xmlns:p="http://schemas.openxmlformats.org/presentationml/2006/main">
-  <p:cSld>
-    <p:spTree>
-      <p:nvGrpSpPr>
-        <p:cNvPr id="1" name="Shape 77"/>
-        <p:cNvGrpSpPr/>
-        <p:nvPr/>
-      </p:nvGrpSpPr>
-      <p:grpSpPr>
-        <a:xfrm>
-          <a:off x="0" y="0"/>
-          <a:ext cx="0" cy="0"/>
-          <a:chOff x="0" y="0"/>
-          <a:chExt cx="0" cy="0"/>
-        </a:xfrm>
-      </p:grpSpPr>
-      <p:sp>
-        <p:nvSpPr>
-          <p:cNvPr id="78" name="Shape 78"/>
-          <p:cNvSpPr txBox="1">
-            <a:spLocks noGrp="1"/>
-          </p:cNvSpPr>
-          <p:nvPr>
-            <p:ph type="body" idx="1"/>
-          </p:nvPr>
-        </p:nvSpPr>
-        <p:spPr>
-          <a:xfrm>
-            <a:off x="437883" y="1658990"/>
-            <a:ext cx="8248799" cy="4840199"/>
-          </a:xfrm>
-          <a:prstGeom prst="rect">
-            <a:avLst/>
-          </a:prstGeom>
-        </p:spPr>
-        <p:txBody>
-          <a:bodyPr lIns="91425" tIns="91425" rIns="91425" bIns="91425" anchor="t" anchorCtr="0">
-            <a:noAutofit/>
-          </a:bodyPr>
-          <a:lstStyle/>
-          <a:p>
-            <a:pPr marL="457200" lvl="0" indent="-431800" rtl="0">
-              <a:buClr>
-                <a:schemeClr val="dk2"/>
-              </a:buClr>
-              <a:buSzPct val="166666"/>
-              <a:buFont typeface="Arial"/>
-              <a:buChar char="•"/>
-            </a:pPr>
-            <a:r>
-              <a:rPr lang="en"/>
-              <a:t>Students will...</a:t>
-            </a:r>
-          </a:p>
-          <a:p>
-            <a:pPr marL="914400" lvl="1" indent="-406400" rtl="0">
-              <a:spcBef>
-                <a:spcPts val="560"/>
-              </a:spcBef>
-              <a:buClr>
-                <a:schemeClr val="dk2"/>
-              </a:buClr>
-              <a:buSzPct val="100000"/>
-              <a:buFont typeface="Courier New"/>
-              <a:buChar char="o"/>
-            </a:pPr>
-            <a:r>
-              <a:rPr lang="en" sz="2800"/>
-              <a:t>Receive their peer's work</a:t>
-            </a:r>
-          </a:p>
-          <a:p>
-            <a:pPr marL="914400" lvl="1" indent="-406400" rtl="0">
-              <a:spcBef>
-                <a:spcPts val="560"/>
-              </a:spcBef>
-              <a:buClr>
-                <a:schemeClr val="dk2"/>
-              </a:buClr>
-              <a:buSzPct val="100000"/>
-              <a:buFont typeface="Courier New"/>
-              <a:buChar char="o"/>
-            </a:pPr>
-            <a:r>
-              <a:rPr lang="en" sz="2800"/>
-              <a:t>Fill out </a:t>
-            </a:r>
-            <a:r>
-              <a:rPr lang="en"/>
-              <a:t>the grading rubric based on </a:t>
-            </a:r>
-            <a:r>
-              <a:rPr lang="en" sz="2800"/>
-              <a:t>the work</a:t>
-            </a:r>
-          </a:p>
-          <a:p>
-            <a:pPr marL="914400" lvl="1" indent="-406400" rtl="0">
-              <a:spcBef>
-                <a:spcPts val="560"/>
-              </a:spcBef>
-              <a:buClr>
-                <a:schemeClr val="dk2"/>
-              </a:buClr>
-              <a:buSzPct val="100000"/>
-              <a:buFont typeface="Courier New"/>
-              <a:buChar char="o"/>
-            </a:pPr>
-            <a:r>
-              <a:rPr lang="en" sz="2800"/>
-              <a:t>See anonymous feedback from </a:t>
-            </a:r>
-            <a:r>
-              <a:rPr lang="en"/>
-              <a:t>their </a:t>
-            </a:r>
-            <a:r>
-              <a:rPr lang="en" sz="2800"/>
-              <a:t>peers</a:t>
-            </a:r>
-          </a:p>
-          <a:p>
-            <a:pPr marL="457200" lvl="0" indent="-431800" rtl="0">
-              <a:spcBef>
-                <a:spcPts val="560"/>
-              </a:spcBef>
-              <a:buClr>
-                <a:schemeClr val="dk2"/>
-              </a:buClr>
-              <a:buSzPct val="166666"/>
-              <a:buFont typeface="Arial"/>
-              <a:buChar char="•"/>
-            </a:pPr>
-            <a:r>
-              <a:rPr lang="en"/>
-              <a:t>Faculty will be able to add comments to biased or non-constructive reviews</a:t>
-            </a:r>
-          </a:p>
-          <a:p>
-            <a:pPr marL="457200" lvl="0" indent="-431800" rtl="0">
-              <a:spcBef>
-                <a:spcPts val="560"/>
-              </a:spcBef>
-              <a:buClr>
-                <a:schemeClr val="dk2"/>
-              </a:buClr>
-              <a:buSzPct val="166666"/>
-              <a:buFont typeface="Arial"/>
-              <a:buChar char="•"/>
-            </a:pPr>
-            <a:r>
-              <a:rPr lang="en"/>
-              <a:t>Create new swap, process repeats</a:t>
-            </a:r>
-          </a:p>
-          <a:p>
-            <a:pPr marL="914400" lvl="1" indent="-406400" rtl="0">
-              <a:spcBef>
-                <a:spcPts val="560"/>
-              </a:spcBef>
-              <a:buClr>
-                <a:schemeClr val="dk2"/>
-              </a:buClr>
-              <a:buSzPct val="87500"/>
-              <a:buFont typeface="Courier New"/>
-              <a:buChar char="o"/>
-            </a:pPr>
-            <a:r>
-              <a:rPr lang="en"/>
-              <a:t>Based on previous assignment</a:t>
-            </a:r>
-          </a:p>
-        </p:txBody>
-      </p:sp>
-      <p:sp>
-        <p:nvSpPr>
-          <p:cNvPr id="79" name="Shape 79"/>
-          <p:cNvSpPr txBox="1">
-            <a:spLocks noGrp="1"/>
-          </p:cNvSpPr>
-          <p:nvPr>
-            <p:ph type="title"/>
-          </p:nvPr>
-        </p:nvSpPr>
-        <p:spPr>
-          <a:prstGeom prst="rect">
-            <a:avLst/>
-          </a:prstGeom>
-        </p:spPr>
-        <p:txBody>
-          <a:bodyPr lIns="91425" tIns="91425" rIns="91425" bIns="91425" anchor="b" anchorCtr="0">
-            <a:noAutofit/>
-          </a:bodyPr>
-          <a:lstStyle/>
-          <a:p>
-            <a:pPr>
-              <a:buNone/>
-            </a:pPr>
-            <a:r>
-              <a:rPr lang="en"/>
-              <a:t>Code Review Process, Part 2</a:t>
             </a:r>
           </a:p>
         </p:txBody>
@@ -6020,6 +5885,230 @@
 </file>
 
 <file path=ppt/slides/slide7.xml><?xml version="1.0" encoding="utf-8"?>
+<p:sld xmlns:a="http://schemas.openxmlformats.org/drawingml/2006/main" xmlns:r="http://schemas.openxmlformats.org/officeDocument/2006/relationships" xmlns:p="http://schemas.openxmlformats.org/presentationml/2006/main">
+  <p:cSld>
+    <p:spTree>
+      <p:nvGrpSpPr>
+        <p:cNvPr id="1" name="Shape 77"/>
+        <p:cNvGrpSpPr/>
+        <p:nvPr/>
+      </p:nvGrpSpPr>
+      <p:grpSpPr>
+        <a:xfrm>
+          <a:off x="0" y="0"/>
+          <a:ext cx="0" cy="0"/>
+          <a:chOff x="0" y="0"/>
+          <a:chExt cx="0" cy="0"/>
+        </a:xfrm>
+      </p:grpSpPr>
+      <p:sp>
+        <p:nvSpPr>
+          <p:cNvPr id="78" name="Shape 78"/>
+          <p:cNvSpPr txBox="1">
+            <a:spLocks noGrp="1"/>
+          </p:cNvSpPr>
+          <p:nvPr>
+            <p:ph type="body" idx="1"/>
+          </p:nvPr>
+        </p:nvSpPr>
+        <p:spPr>
+          <a:xfrm>
+            <a:off x="437883" y="1658990"/>
+            <a:ext cx="8248799" cy="4840199"/>
+          </a:xfrm>
+          <a:prstGeom prst="rect">
+            <a:avLst/>
+          </a:prstGeom>
+        </p:spPr>
+        <p:txBody>
+          <a:bodyPr lIns="91425" tIns="91425" rIns="91425" bIns="91425" anchor="t" anchorCtr="0">
+            <a:noAutofit/>
+          </a:bodyPr>
+          <a:lstStyle/>
+          <a:p>
+            <a:pPr marL="457200" lvl="0" indent="-431800" rtl="0">
+              <a:buClr>
+                <a:schemeClr val="dk2"/>
+              </a:buClr>
+              <a:buSzPct val="166666"/>
+              <a:buFont typeface="Arial"/>
+              <a:buChar char="•"/>
+            </a:pPr>
+            <a:r>
+              <a:rPr lang="en"/>
+              <a:t>Students will...</a:t>
+            </a:r>
+          </a:p>
+          <a:p>
+            <a:pPr marL="914400" lvl="1" indent="-406400" rtl="0">
+              <a:spcBef>
+                <a:spcPts val="560"/>
+              </a:spcBef>
+              <a:buClr>
+                <a:schemeClr val="dk2"/>
+              </a:buClr>
+              <a:buSzPct val="100000"/>
+              <a:buFont typeface="Courier New"/>
+              <a:buChar char="o"/>
+            </a:pPr>
+            <a:r>
+              <a:rPr lang="en" sz="2800"/>
+              <a:t>Receive their peer's work</a:t>
+            </a:r>
+          </a:p>
+          <a:p>
+            <a:pPr marL="914400" lvl="1" indent="-406400" rtl="0">
+              <a:spcBef>
+                <a:spcPts val="560"/>
+              </a:spcBef>
+              <a:buClr>
+                <a:schemeClr val="dk2"/>
+              </a:buClr>
+              <a:buSzPct val="100000"/>
+              <a:buFont typeface="Courier New"/>
+              <a:buChar char="o"/>
+            </a:pPr>
+            <a:r>
+              <a:rPr lang="en" sz="2800"/>
+              <a:t>Fill out </a:t>
+            </a:r>
+            <a:r>
+              <a:rPr lang="en"/>
+              <a:t>the grading rubric based on </a:t>
+            </a:r>
+            <a:r>
+              <a:rPr lang="en" sz="2800"/>
+              <a:t>the work</a:t>
+            </a:r>
+          </a:p>
+          <a:p>
+            <a:pPr marL="914400" lvl="1" indent="-406400" rtl="0">
+              <a:spcBef>
+                <a:spcPts val="560"/>
+              </a:spcBef>
+              <a:buClr>
+                <a:schemeClr val="dk2"/>
+              </a:buClr>
+              <a:buSzPct val="100000"/>
+              <a:buFont typeface="Courier New"/>
+              <a:buChar char="o"/>
+            </a:pPr>
+            <a:r>
+              <a:rPr lang="en" sz="2800"/>
+              <a:t>See anonymous feedback from </a:t>
+            </a:r>
+            <a:r>
+              <a:rPr lang="en"/>
+              <a:t>their </a:t>
+            </a:r>
+            <a:r>
+              <a:rPr lang="en" sz="2800"/>
+              <a:t>peers</a:t>
+            </a:r>
+          </a:p>
+          <a:p>
+            <a:pPr marL="457200" lvl="0" indent="-431800" rtl="0">
+              <a:spcBef>
+                <a:spcPts val="560"/>
+              </a:spcBef>
+              <a:buClr>
+                <a:schemeClr val="dk2"/>
+              </a:buClr>
+              <a:buSzPct val="166666"/>
+              <a:buFont typeface="Arial"/>
+              <a:buChar char="•"/>
+            </a:pPr>
+            <a:r>
+              <a:rPr lang="en"/>
+              <a:t>Faculty will be able to add comments to biased or non-constructive reviews</a:t>
+            </a:r>
+          </a:p>
+          <a:p>
+            <a:pPr marL="457200" lvl="0" indent="-431800" rtl="0">
+              <a:spcBef>
+                <a:spcPts val="560"/>
+              </a:spcBef>
+              <a:buClr>
+                <a:schemeClr val="dk2"/>
+              </a:buClr>
+              <a:buSzPct val="166666"/>
+              <a:buFont typeface="Arial"/>
+              <a:buChar char="•"/>
+            </a:pPr>
+            <a:r>
+              <a:rPr lang="en"/>
+              <a:t>Create new swap, process repeats</a:t>
+            </a:r>
+          </a:p>
+          <a:p>
+            <a:pPr marL="914400" lvl="1" indent="-406400" rtl="0">
+              <a:spcBef>
+                <a:spcPts val="560"/>
+              </a:spcBef>
+              <a:buClr>
+                <a:schemeClr val="dk2"/>
+              </a:buClr>
+              <a:buSzPct val="87500"/>
+              <a:buFont typeface="Courier New"/>
+              <a:buChar char="o"/>
+            </a:pPr>
+            <a:r>
+              <a:rPr lang="en"/>
+              <a:t>Based on previous assignment</a:t>
+            </a:r>
+          </a:p>
+        </p:txBody>
+      </p:sp>
+      <p:sp>
+        <p:nvSpPr>
+          <p:cNvPr id="79" name="Shape 79"/>
+          <p:cNvSpPr txBox="1">
+            <a:spLocks noGrp="1"/>
+          </p:cNvSpPr>
+          <p:nvPr>
+            <p:ph type="title"/>
+          </p:nvPr>
+        </p:nvSpPr>
+        <p:spPr>
+          <a:prstGeom prst="rect">
+            <a:avLst/>
+          </a:prstGeom>
+        </p:spPr>
+        <p:txBody>
+          <a:bodyPr lIns="91425" tIns="91425" rIns="91425" bIns="91425" anchor="b" anchorCtr="0">
+            <a:noAutofit/>
+          </a:bodyPr>
+          <a:lstStyle/>
+          <a:p>
+            <a:pPr>
+              <a:buNone/>
+            </a:pPr>
+            <a:r>
+              <a:rPr lang="en"/>
+              <a:t>Code Review Process, Part 2</a:t>
+            </a:r>
+          </a:p>
+        </p:txBody>
+      </p:sp>
+    </p:spTree>
+  </p:cSld>
+  <p:clrMapOvr>
+    <a:masterClrMapping/>
+  </p:clrMapOvr>
+  <p:transition spd="slow">
+    <p:cut/>
+  </p:transition>
+  <p:timing>
+    <p:tnLst>
+      <p:par>
+        <p:cTn id="1" dur="indefinite" restart="never" nodeType="tmRoot"/>
+      </p:par>
+    </p:tnLst>
+  </p:timing>
+</p:sld>
+</file>
+
+<file path=ppt/slides/slide8.xml><?xml version="1.0" encoding="utf-8"?>
 <p:sld xmlns:a="http://schemas.openxmlformats.org/drawingml/2006/main" xmlns:r="http://schemas.openxmlformats.org/officeDocument/2006/relationships" xmlns:p="http://schemas.openxmlformats.org/presentationml/2006/main">
   <p:cSld>
     <p:spTree>

</xml_diff>